<commit_message>
Fix truncated text in 2026-02-11 detailed analysis
Regenerated report with sentence-boundary splitting instead of
hard 30-char truncation in timeline descriptions.

Co-Authored-By: Claude Opus 4.6 <noreply@anthropic.com>
</commit_message>
<xml_diff>
--- a/2026-02-11/report.pptx
+++ b/2026-02-11/report.pptx
@@ -3559,7 +3559,7 @@
               </a:defRPr>
             </a:pPr>
             <a:r>
-              <a:t>InfoQ: https://www.infoq.com/news/2026/01/microsoft-llm-contextual-privacy/</a:t>
+              <a:t>NBC News: https://www.nbcnews.com/tech/internet/openai-starts-testing-ads-chatgpt-rcna258242</a:t>
             </a:r>
           </a:p>
           <a:p>
@@ -3575,7 +3575,7 @@
               </a:defRPr>
             </a:pPr>
             <a:r>
-              <a:t>NBC News: https://www.nbcnews.com/tech/internet/openai-starts-testing-ads-chatgpt-rcna258242</a:t>
+              <a:t>Intellizence: https://intellizence.com/insights/startup-funding/startup-funding-trends-january-2026-ai-infrastructure-and-robotics/</a:t>
             </a:r>
           </a:p>
           <a:p>
@@ -3591,7 +3591,7 @@
               </a:defRPr>
             </a:pPr>
             <a:r>
-              <a:t>Axios: https://www.axios.com/2026/02/10/ai-ceo-feuds-openai-anthropic-google</a:t>
+              <a:t>Tech Xplore: https://techxplore.com/news/2026-02-ai-limits-generative-video.html</a:t>
             </a:r>
           </a:p>
           <a:p>
@@ -3607,7 +3607,7 @@
               </a:defRPr>
             </a:pPr>
             <a:r>
-              <a:t>Digital Watch Observatory: https://dig.watch/updates/adobe-firefly-unlocks-powerful-unlimited-ai-generation-in-2026</a:t>
+              <a:t>National Law Review: https://natlawreview.com/article/2026-outlook-artificial-intelligence</a:t>
             </a:r>
           </a:p>
           <a:p>
@@ -3623,7 +3623,7 @@
               </a:defRPr>
             </a:pPr>
             <a:r>
-              <a:t>DigiTimes: https://www.digitimes.com/news/a20251215PD230/meta-ai-llm-llama-development.html</a:t>
+              <a:t>Medium: https://medium.com/@urano10/the-future-of-ai-models-in-2026-whats-actually-coming-410141f3c979</a:t>
             </a:r>
           </a:p>
           <a:p>
@@ -3639,7 +3639,7 @@
               </a:defRPr>
             </a:pPr>
             <a:r>
-              <a:t>Medium: https://medium.com/@urano10/the-future-of-ai-models-in-2026-whats-actually-coming-410141f3c979</a:t>
+              <a:t>DigiTimes: https://www.digitimes.com/news/a20251215PD230/meta-ai-llm-llama-development.html</a:t>
             </a:r>
           </a:p>
           <a:p>
@@ -3655,7 +3655,7 @@
               </a:defRPr>
             </a:pPr>
             <a:r>
-              <a:t>TechCrunch: https://techcrunch.com/2026/01/02/in-2026-ai-will-move-from-hype-to-pragmatism/</a:t>
+              <a:t>TechCrunch: https://techcrunch.com/2026/02/10/ai-video-startup-runway-raises-315m-at-5-3b-valuation-eyes-more-capable-world-models/</a:t>
             </a:r>
           </a:p>
           <a:p>
@@ -3671,7 +3671,7 @@
               </a:defRPr>
             </a:pPr>
             <a:r>
-              <a:t>National Law Review: https://natlawreview.com/article/2026-outlook-artificial-intelligence</a:t>
+              <a:t>Axios: https://www.axios.com/2026/02/10/ai-ceo-feuds-openai-anthropic-google</a:t>
             </a:r>
           </a:p>
           <a:p>
@@ -3687,7 +3687,7 @@
               </a:defRPr>
             </a:pPr>
             <a:r>
-              <a:t>Tech Xplore: https://techxplore.com/news/2026-02-ai-limits-generative-video.html</a:t>
+              <a:t>MIT Technology Review: https://www.technologyreview.com/2026/01/05/1130662/whats-next-for-ai-in-2026/</a:t>
             </a:r>
           </a:p>
           <a:p>
@@ -3703,7 +3703,7 @@
               </a:defRPr>
             </a:pPr>
             <a:r>
-              <a:t>MIT Technology Review: https://www.technologyreview.com/2026/01/05/1130662/whats-next-for-ai-in-2026/</a:t>
+              <a:t>TechCrunch: https://techcrunch.com/2026/01/02/in-2026-ai-will-move-from-hype-to-pragmatism/</a:t>
             </a:r>
           </a:p>
           <a:p>
@@ -3719,7 +3719,7 @@
               </a:defRPr>
             </a:pPr>
             <a:r>
-              <a:t>TechCrunch: https://techcrunch.com/2026/02/10/ai-video-startup-runway-raises-315m-at-5-3b-valuation-eyes-more-capable-world-models/</a:t>
+              <a:t>Digital Watch Observatory: https://dig.watch/updates/adobe-firefly-unlocks-powerful-unlimited-ai-generation-in-2026</a:t>
             </a:r>
           </a:p>
           <a:p>
@@ -3735,7 +3735,7 @@
               </a:defRPr>
             </a:pPr>
             <a:r>
-              <a:t>Intellizence: https://intellizence.com/insights/startup-funding/startup-funding-trends-january-2026-ai-infrastructure-and-robotics/</a:t>
+              <a:t>InfoQ: https://www.infoq.com/news/2026/01/microsoft-llm-contextual-privacy/</a:t>
             </a:r>
           </a:p>
         </p:txBody>

</xml_diff>

<commit_message>
Responsive redesign: 960px fixed → 96% fluid, 4-tier breakpoints
- Container width: 960px → 96% (fills PC/wide screens)
- Breakpoints: 1-tier (768px) → 4-tier (576/1024/1600px)
- Tab navigation: horizontal scroll on mobile
- Regenerated 2026-02-10 & 2026-02-11 reports
- Updated specification.html (FR-10, NF-04)

Co-Authored-By: Claude Opus 4.6 <noreply@anthropic.com>
</commit_message>
<xml_diff>
--- a/2026-02-11/report.pptx
+++ b/2026-02-11/report.pptx
@@ -4013,7 +4013,7 @@
               </a:defRPr>
             </a:pPr>
             <a:r>
-              <a:t>► Intellizence: https://intellizence.com/insights/startup-funding/startup-funding-trends-january-2026-ai-infrastructure-and-robotics/</a:t>
+              <a:t>► NBC News: https://www.nbcnews.com/tech/internet/openai-starts-testing-ads-chatgpt-rcna258242</a:t>
             </a:r>
           </a:p>
           <a:p>
@@ -4029,7 +4029,7 @@
               </a:defRPr>
             </a:pPr>
             <a:r>
-              <a:t>► Digital Watch Observatory: https://dig.watch/updates/adobe-firefly-unlocks-powerful-unlimited-ai-generation-in-2026</a:t>
+              <a:t>► Medium: https://medium.com/@urano10/the-future-of-ai-models-in-2026-whats-actually-coming-410141f3c979</a:t>
             </a:r>
           </a:p>
           <a:p>
@@ -4045,7 +4045,7 @@
               </a:defRPr>
             </a:pPr>
             <a:r>
-              <a:t>► Axios: https://www.axios.com/2026/02/10/ai-ceo-feuds-openai-anthropic-google</a:t>
+              <a:t>► DigiTimes: https://www.digitimes.com/news/a20251215PD230/meta-ai-llm-llama-development.html</a:t>
             </a:r>
           </a:p>
           <a:p>
@@ -4061,7 +4061,7 @@
               </a:defRPr>
             </a:pPr>
             <a:r>
-              <a:t>► InfoQ: https://www.infoq.com/news/2026/01/microsoft-llm-contextual-privacy/</a:t>
+              <a:t>► TechCrunch: https://techcrunch.com/2026/01/02/in-2026-ai-will-move-from-hype-to-pragmatism/</a:t>
             </a:r>
           </a:p>
           <a:p>
@@ -4077,7 +4077,7 @@
               </a:defRPr>
             </a:pPr>
             <a:r>
-              <a:t>► Tech Xplore: https://techxplore.com/news/2026-02-ai-limits-generative-video.html</a:t>
+              <a:t>► TechCrunch: https://techcrunch.com/2026/02/10/ai-video-startup-runway-raises-315m-at-5-3b-valuation-eyes-more-capable-world-models/</a:t>
             </a:r>
           </a:p>
           <a:p>
@@ -4093,7 +4093,7 @@
               </a:defRPr>
             </a:pPr>
             <a:r>
-              <a:t>► NBC News: https://www.nbcnews.com/tech/internet/openai-starts-testing-ads-chatgpt-rcna258242</a:t>
+              <a:t>► Tech Xplore: https://techxplore.com/news/2026-02-ai-limits-generative-video.html</a:t>
             </a:r>
           </a:p>
         </p:txBody>
@@ -4142,7 +4142,7 @@
               </a:defRPr>
             </a:pPr>
             <a:r>
-              <a:t>► Medium: https://medium.com/@urano10/the-future-of-ai-models-in-2026-whats-actually-coming-410141f3c979</a:t>
+              <a:t>► Axios: https://www.axios.com/2026/02/10/ai-ceo-feuds-openai-anthropic-google</a:t>
             </a:r>
           </a:p>
           <a:p>
@@ -4158,7 +4158,7 @@
               </a:defRPr>
             </a:pPr>
             <a:r>
-              <a:t>► MIT Technology Review: https://www.technologyreview.com/2026/01/05/1130662/whats-next-for-ai-in-2026/</a:t>
+              <a:t>► Intellizence: https://intellizence.com/insights/startup-funding/startup-funding-trends-january-2026-ai-infrastructure-and-robotics/</a:t>
             </a:r>
           </a:p>
           <a:p>
@@ -4190,7 +4190,7 @@
               </a:defRPr>
             </a:pPr>
             <a:r>
-              <a:t>► TechCrunch: https://techcrunch.com/2026/02/10/ai-video-startup-runway-raises-315m-at-5-3b-valuation-eyes-more-capable-world-models/</a:t>
+              <a:t>► Digital Watch Observatory: https://dig.watch/updates/adobe-firefly-unlocks-powerful-unlimited-ai-generation-in-2026</a:t>
             </a:r>
           </a:p>
           <a:p>
@@ -4206,7 +4206,7 @@
               </a:defRPr>
             </a:pPr>
             <a:r>
-              <a:t>► DigiTimes: https://www.digitimes.com/news/a20251215PD230/meta-ai-llm-llama-development.html</a:t>
+              <a:t>► MIT Technology Review: https://www.technologyreview.com/2026/01/05/1130662/whats-next-for-ai-in-2026/</a:t>
             </a:r>
           </a:p>
           <a:p>
@@ -4222,7 +4222,7 @@
               </a:defRPr>
             </a:pPr>
             <a:r>
-              <a:t>► TechCrunch: https://techcrunch.com/2026/01/02/in-2026-ai-will-move-from-hype-to-pragmatism/</a:t>
+              <a:t>► InfoQ: https://www.infoq.com/news/2026/01/microsoft-llm-contextual-privacy/</a:t>
             </a:r>
           </a:p>
         </p:txBody>

</xml_diff>